<commit_message>
Versão Final - BD, Versão de Erros  e Documentação
</commit_message>
<xml_diff>
--- a/Projeto Integrador - versão final/PROJETO INTEGRADOR fim.pptx apres.pptx
+++ b/Projeto Integrador - versão final/PROJETO INTEGRADOR fim.pptx apres.pptx
@@ -10,8 +10,9 @@
     <p:sldId id="258" r:id="rId4"/>
     <p:sldId id="259" r:id="rId5"/>
     <p:sldId id="260" r:id="rId6"/>
-    <p:sldId id="261" r:id="rId7"/>
-    <p:sldId id="262" r:id="rId8"/>
+    <p:sldId id="263" r:id="rId7"/>
+    <p:sldId id="261" r:id="rId8"/>
+    <p:sldId id="262" r:id="rId9"/>
   </p:sldIdLst>
   <p:sldSz cx="12192000" cy="6858000"/>
   <p:notesSz cx="6858000" cy="9144000"/>
@@ -3032,44 +3033,16 @@
             </a:pPr>
             <a:r>
               <a:rPr lang="pt-BR" dirty="0" smtClean="0"/>
-              <a:t>            Desenvolvemos </a:t>
-            </a:r>
+              <a:t>            Desenvolvemos uma imobiliária fictícia, a IMOBIL, que                   preza a facilidade na compra, aluguel e venda de imóveis.</a:t>
+            </a:r>
+          </a:p>
+          <a:p>
+            <a:pPr marL="0" indent="0">
+              <a:buNone/>
+            </a:pPr>
             <a:r>
               <a:rPr lang="pt-BR" dirty="0" smtClean="0"/>
-              <a:t>uma imobiliária fictícia, a IMOBIL, que </a:t>
-            </a:r>
-            <a:r>
-              <a:rPr lang="pt-BR" dirty="0" smtClean="0"/>
-              <a:t>                  preza </a:t>
-            </a:r>
-            <a:r>
-              <a:rPr lang="pt-BR" dirty="0" smtClean="0"/>
-              <a:t>a facilidade na compra, aluguel e venda de imóveis</a:t>
-            </a:r>
-            <a:r>
-              <a:rPr lang="pt-BR" dirty="0" smtClean="0"/>
-              <a:t>.</a:t>
-            </a:r>
-          </a:p>
-          <a:p>
-            <a:pPr marL="0" indent="0">
-              <a:buNone/>
-            </a:pPr>
-            <a:r>
-              <a:rPr lang="pt-BR" dirty="0" smtClean="0"/>
-              <a:t>           Quando desenvolvemos </a:t>
-            </a:r>
-            <a:r>
-              <a:rPr lang="pt-BR" dirty="0" smtClean="0"/>
-              <a:t>este projeto, pensamos em deixar o </a:t>
-            </a:r>
-            <a:r>
-              <a:rPr lang="pt-BR" dirty="0" smtClean="0"/>
-              <a:t>processo imobiliário </a:t>
-            </a:r>
-            <a:r>
-              <a:rPr lang="pt-BR" dirty="0" smtClean="0"/>
-              <a:t>o menos burocrático possível. </a:t>
+              <a:t>           Quando desenvolvemos este projeto, pensamos em deixar o processo imobiliário o menos burocrático possível. </a:t>
             </a:r>
             <a:endParaRPr lang="pt-BR" dirty="0"/>
           </a:p>
@@ -3343,7 +3316,6 @@
               <a:rPr lang="pt-BR" sz="2800" dirty="0"/>
               <a:t>é simplificar a aquisição de imóveis, seja por compra, venda ou aluguel. Prezamos a facilidade no contato entre proprietário e inquilino, tornando também o processo de documentação, reconhecimento de firma e outros trâmites o menos burocrático possível.</a:t>
             </a:r>
-            <a:endParaRPr lang="pt-BR" sz="2800" dirty="0"/>
           </a:p>
         </p:txBody>
       </p:sp>
@@ -3487,7 +3459,6 @@
               <a:rPr lang="pt-BR" sz="8600" dirty="0"/>
               <a:t> </a:t>
             </a:r>
-            <a:endParaRPr lang="pt-BR" sz="8600" dirty="0"/>
           </a:p>
           <a:p>
             <a:r>
@@ -3809,6 +3780,208 @@
       </p:grpSpPr>
       <p:sp>
         <p:nvSpPr>
+          <p:cNvPr id="2" name="CaixaDeTexto 1"/>
+          <p:cNvSpPr txBox="1"/>
+          <p:nvPr/>
+        </p:nvSpPr>
+        <p:spPr>
+          <a:xfrm>
+            <a:off x="1671145" y="367862"/>
+            <a:ext cx="9186041" cy="4801314"/>
+          </a:xfrm>
+          <a:prstGeom prst="rect">
+            <a:avLst/>
+          </a:prstGeom>
+          <a:noFill/>
+        </p:spPr>
+        <p:txBody>
+          <a:bodyPr wrap="square" rtlCol="0">
+            <a:spAutoFit/>
+          </a:bodyPr>
+          <a:lstStyle/>
+          <a:p>
+            <a:pPr lvl="0"/>
+            <a:r>
+              <a:rPr lang="pt-BR" b="1" dirty="0"/>
+              <a:t>CONCLUSÃO</a:t>
+            </a:r>
+            <a:endParaRPr lang="pt-BR" dirty="0"/>
+          </a:p>
+          <a:p>
+            <a:r>
+              <a:rPr lang="pt-BR" b="1" dirty="0"/>
+              <a:t> </a:t>
+            </a:r>
+            <a:endParaRPr lang="pt-BR" dirty="0"/>
+          </a:p>
+          <a:p>
+            <a:r>
+              <a:rPr lang="pt-BR" b="1" dirty="0"/>
+              <a:t> </a:t>
+            </a:r>
+            <a:endParaRPr lang="pt-BR" dirty="0"/>
+          </a:p>
+          <a:p>
+            <a:r>
+              <a:rPr lang="pt-BR" sz="1200" dirty="0"/>
+              <a:t>Max de Oliveira:  “Fiz o HTML e o CSS do site, e minha maior dificuldade foi fazer o que me foi proposto de maneira rápida, separar as imagens uma ao lado da outra. Além disso, demorei um pouquinho para fazer o carrossel, mas no final deu tudo certo”.</a:t>
+            </a:r>
+          </a:p>
+          <a:p>
+            <a:r>
+              <a:rPr lang="pt-BR" sz="1200" dirty="0"/>
+              <a:t> </a:t>
+            </a:r>
+          </a:p>
+          <a:p>
+            <a:r>
+              <a:rPr lang="pt-BR" sz="1200" dirty="0"/>
+              <a:t> </a:t>
+            </a:r>
+          </a:p>
+          <a:p>
+            <a:r>
+              <a:rPr lang="pt-BR" sz="1200" dirty="0"/>
+              <a:t>Murilo Hilário: “Fiz o design do site, criando sua logotipo e protótipo usando o site </a:t>
+            </a:r>
+            <a:r>
+              <a:rPr lang="pt-BR" sz="1200" dirty="0" err="1"/>
+              <a:t>Figma</a:t>
+            </a:r>
+            <a:r>
+              <a:rPr lang="pt-BR" sz="1200" dirty="0"/>
+              <a:t>. Não está relacionado ao design, mas também criei o diagrama do banco de dados”.</a:t>
+            </a:r>
+          </a:p>
+          <a:p>
+            <a:r>
+              <a:rPr lang="pt-BR" sz="1200" b="1" dirty="0"/>
+              <a:t> </a:t>
+            </a:r>
+            <a:endParaRPr lang="pt-BR" sz="1200" dirty="0"/>
+          </a:p>
+          <a:p>
+            <a:r>
+              <a:rPr lang="pt-BR" sz="1200" b="1" dirty="0"/>
+              <a:t> </a:t>
+            </a:r>
+            <a:endParaRPr lang="pt-BR" sz="1200" dirty="0"/>
+          </a:p>
+          <a:p>
+            <a:r>
+              <a:rPr lang="pt-BR" sz="1200" b="1" dirty="0"/>
+              <a:t> </a:t>
+            </a:r>
+            <a:r>
+              <a:rPr lang="pt-BR" sz="1200" dirty="0"/>
+              <a:t>Rafael Araújo:</a:t>
+            </a:r>
+            <a:r>
+              <a:rPr lang="pt-BR" sz="1200" b="1" dirty="0"/>
+              <a:t> “</a:t>
+            </a:r>
+            <a:r>
+              <a:rPr lang="pt-BR" sz="1200" dirty="0"/>
+              <a:t>Contribui no Projeto com a parte de desenvolvimento Back-end. Meu grupo projetou um Banco de Dados e um site sobre uma imobiliária fictícia, a “IMOBIL”. Tivemos desafios na fase de unir o Back-</a:t>
+            </a:r>
+            <a:r>
+              <a:rPr lang="pt-BR" sz="1200" dirty="0" err="1"/>
+              <a:t>End</a:t>
+            </a:r>
+            <a:r>
+              <a:rPr lang="pt-BR" sz="1200" dirty="0"/>
+              <a:t> e Front-</a:t>
+            </a:r>
+            <a:r>
+              <a:rPr lang="pt-BR" sz="1200" dirty="0" err="1"/>
+              <a:t>End</a:t>
+            </a:r>
+            <a:r>
+              <a:rPr lang="pt-BR" sz="1200" dirty="0"/>
+              <a:t> neste projeto, mas superamos com trabalho em equipe e espírito de corpo”.</a:t>
+            </a:r>
+          </a:p>
+          <a:p>
+            <a:r>
+              <a:rPr lang="pt-BR" sz="1200" dirty="0"/>
+              <a:t> </a:t>
+            </a:r>
+          </a:p>
+          <a:p>
+            <a:r>
+              <a:rPr lang="pt-BR" sz="1200" dirty="0"/>
+              <a:t> </a:t>
+            </a:r>
+          </a:p>
+          <a:p>
+            <a:r>
+              <a:rPr lang="pt-BR" sz="1200" dirty="0"/>
+              <a:t>Sávio Ayres: “Fiquei responsável por documentar tudo o que desenvolvemos ao longo destas 5 aulas práticas. Gostamos bastante do tema escolhido por ter sido diferente dos outros sites que desenvolvemos nas Unidades Curriculares anteriores. Apesar do período curtinho de tempo, consegui filtrar toda a ação do grupo através deste documento, e fiquei muito satisfeito com o meu trabalho e de meus colegas”.</a:t>
+            </a:r>
+          </a:p>
+          <a:p>
+            <a:r>
+              <a:rPr lang="pt-BR" sz="1200" dirty="0"/>
+              <a:t> </a:t>
+            </a:r>
+          </a:p>
+          <a:p>
+            <a:r>
+              <a:rPr lang="pt-BR" sz="1200" dirty="0"/>
+              <a:t> </a:t>
+            </a:r>
+          </a:p>
+          <a:p>
+            <a:r>
+              <a:rPr lang="pt-BR" sz="1200" dirty="0"/>
+              <a:t>Vanessa Alves de Morais: “ Fiz a parte do desenvolvimento Back-End. Fizemos um Banco de Dados e um trabalho sobre uma imobiliária fictícia, a “IMOBIL”. Tivemos um pouco de dificuldade na parte de “juntar” o Back e o Front-</a:t>
+            </a:r>
+            <a:r>
+              <a:rPr lang="pt-BR" sz="1200" dirty="0" err="1"/>
+              <a:t>End</a:t>
+            </a:r>
+            <a:r>
+              <a:rPr lang="pt-BR" sz="1200" dirty="0"/>
+              <a:t>, mas, ao final, conseguimos”.</a:t>
+            </a:r>
+          </a:p>
+          <a:p>
+            <a:endParaRPr lang="pt-BR" sz="1200" dirty="0"/>
+          </a:p>
+        </p:txBody>
+      </p:sp>
+    </p:spTree>
+    <p:extLst>
+      <p:ext uri="{BB962C8B-B14F-4D97-AF65-F5344CB8AC3E}">
+        <p14:creationId xmlns:p14="http://schemas.microsoft.com/office/powerpoint/2010/main" val="3302424734"/>
+      </p:ext>
+    </p:extLst>
+  </p:cSld>
+  <p:clrMapOvr>
+    <a:masterClrMapping/>
+  </p:clrMapOvr>
+</p:sld>
+</file>
+
+<file path=ppt/slides/slide7.xml><?xml version="1.0" encoding="utf-8"?>
+<p:sld xmlns:a="http://schemas.openxmlformats.org/drawingml/2006/main" xmlns:r="http://schemas.openxmlformats.org/officeDocument/2006/relationships" xmlns:p="http://schemas.openxmlformats.org/presentationml/2006/main">
+  <p:cSld>
+    <p:spTree>
+      <p:nvGrpSpPr>
+        <p:cNvPr id="1" name=""/>
+        <p:cNvGrpSpPr/>
+        <p:nvPr/>
+      </p:nvGrpSpPr>
+      <p:grpSpPr>
+        <a:xfrm>
+          <a:off x="0" y="0"/>
+          <a:ext cx="0" cy="0"/>
+          <a:chOff x="0" y="0"/>
+          <a:chExt cx="0" cy="0"/>
+        </a:xfrm>
+      </p:grpSpPr>
+      <p:sp>
+        <p:nvSpPr>
           <p:cNvPr id="2" name="Título 1"/>
           <p:cNvSpPr>
             <a:spLocks noGrp="1"/>
@@ -3920,7 +4093,7 @@
 </p:sld>
 </file>
 
-<file path=ppt/slides/slide7.xml><?xml version="1.0" encoding="utf-8"?>
+<file path=ppt/slides/slide8.xml><?xml version="1.0" encoding="utf-8"?>
 <p:sld xmlns:a="http://schemas.openxmlformats.org/drawingml/2006/main" xmlns:r="http://schemas.openxmlformats.org/officeDocument/2006/relationships" xmlns:p="http://schemas.openxmlformats.org/presentationml/2006/main">
   <p:cSld>
     <p:spTree>

</xml_diff>